<commit_message>
google map search python
</commit_message>
<xml_diff>
--- a/documents/Introduction_presentation.pptx
+++ b/documents/Introduction_presentation.pptx
@@ -490,7 +490,7 @@
           <p:cNvPr id="2" name="Title 1">
             <a:extLst>
               <a:ext uri="{FF2B5EF4-FFF2-40B4-BE49-F238E27FC236}">
-                <a16:creationId xmlns:a16="http://schemas.microsoft.com/office/drawing/2014/main" id="{5257AF7A-499D-4E78-B543-AA5181AD7BA4}"/>
+                <a16:creationId xmlns:a16="http://schemas.microsoft.com/office/drawing/2014/main" xmlns="" id="{5257AF7A-499D-4E78-B543-AA5181AD7BA4}"/>
               </a:ext>
             </a:extLst>
           </p:cNvPr>
@@ -528,7 +528,7 @@
           <p:cNvPr id="3" name="Subtitle 2">
             <a:extLst>
               <a:ext uri="{FF2B5EF4-FFF2-40B4-BE49-F238E27FC236}">
-                <a16:creationId xmlns:a16="http://schemas.microsoft.com/office/drawing/2014/main" id="{6ED3CC58-8586-4CA6-B7C6-F146B6799632}"/>
+                <a16:creationId xmlns:a16="http://schemas.microsoft.com/office/drawing/2014/main" xmlns="" id="{6ED3CC58-8586-4CA6-B7C6-F146B6799632}"/>
               </a:ext>
             </a:extLst>
           </p:cNvPr>
@@ -599,7 +599,7 @@
           <p:cNvPr id="4" name="Date Placeholder 3">
             <a:extLst>
               <a:ext uri="{FF2B5EF4-FFF2-40B4-BE49-F238E27FC236}">
-                <a16:creationId xmlns:a16="http://schemas.microsoft.com/office/drawing/2014/main" id="{60C79D18-CFCF-415E-9F79-D30B8CF35A77}"/>
+                <a16:creationId xmlns:a16="http://schemas.microsoft.com/office/drawing/2014/main" xmlns="" id="{60C79D18-CFCF-415E-9F79-D30B8CF35A77}"/>
               </a:ext>
             </a:extLst>
           </p:cNvPr>
@@ -628,7 +628,7 @@
           <p:cNvPr id="5" name="Footer Placeholder 4">
             <a:extLst>
               <a:ext uri="{FF2B5EF4-FFF2-40B4-BE49-F238E27FC236}">
-                <a16:creationId xmlns:a16="http://schemas.microsoft.com/office/drawing/2014/main" id="{21AF6DCC-B6BE-4CE2-940B-556972050A85}"/>
+                <a16:creationId xmlns:a16="http://schemas.microsoft.com/office/drawing/2014/main" xmlns="" id="{21AF6DCC-B6BE-4CE2-940B-556972050A85}"/>
               </a:ext>
             </a:extLst>
           </p:cNvPr>
@@ -653,7 +653,7 @@
           <p:cNvPr id="6" name="Slide Number Placeholder 5">
             <a:extLst>
               <a:ext uri="{FF2B5EF4-FFF2-40B4-BE49-F238E27FC236}">
-                <a16:creationId xmlns:a16="http://schemas.microsoft.com/office/drawing/2014/main" id="{B11DA524-30E0-4317-ACBA-EE4EA353C83C}"/>
+                <a16:creationId xmlns:a16="http://schemas.microsoft.com/office/drawing/2014/main" xmlns="" id="{B11DA524-30E0-4317-ACBA-EE4EA353C83C}"/>
               </a:ext>
             </a:extLst>
           </p:cNvPr>
@@ -712,7 +712,7 @@
           <p:cNvPr id="2" name="Title 1">
             <a:extLst>
               <a:ext uri="{FF2B5EF4-FFF2-40B4-BE49-F238E27FC236}">
-                <a16:creationId xmlns:a16="http://schemas.microsoft.com/office/drawing/2014/main" id="{99130228-B81A-4FF7-9D9C-4E573C60EE6B}"/>
+                <a16:creationId xmlns:a16="http://schemas.microsoft.com/office/drawing/2014/main" xmlns="" id="{99130228-B81A-4FF7-9D9C-4E573C60EE6B}"/>
               </a:ext>
             </a:extLst>
           </p:cNvPr>
@@ -741,7 +741,7 @@
           <p:cNvPr id="3" name="Vertical Text Placeholder 2">
             <a:extLst>
               <a:ext uri="{FF2B5EF4-FFF2-40B4-BE49-F238E27FC236}">
-                <a16:creationId xmlns:a16="http://schemas.microsoft.com/office/drawing/2014/main" id="{5BA077D8-F1D5-4900-B425-E9F1A1763181}"/>
+                <a16:creationId xmlns:a16="http://schemas.microsoft.com/office/drawing/2014/main" xmlns="" id="{5BA077D8-F1D5-4900-B425-E9F1A1763181}"/>
               </a:ext>
             </a:extLst>
           </p:cNvPr>
@@ -799,7 +799,7 @@
           <p:cNvPr id="4" name="Date Placeholder 3">
             <a:extLst>
               <a:ext uri="{FF2B5EF4-FFF2-40B4-BE49-F238E27FC236}">
-                <a16:creationId xmlns:a16="http://schemas.microsoft.com/office/drawing/2014/main" id="{2AED83CC-30DF-4A2C-955F-74BA22C848D0}"/>
+                <a16:creationId xmlns:a16="http://schemas.microsoft.com/office/drawing/2014/main" xmlns="" id="{2AED83CC-30DF-4A2C-955F-74BA22C848D0}"/>
               </a:ext>
             </a:extLst>
           </p:cNvPr>
@@ -828,7 +828,7 @@
           <p:cNvPr id="5" name="Footer Placeholder 4">
             <a:extLst>
               <a:ext uri="{FF2B5EF4-FFF2-40B4-BE49-F238E27FC236}">
-                <a16:creationId xmlns:a16="http://schemas.microsoft.com/office/drawing/2014/main" id="{21CC82E2-9AF2-4638-B02F-6BB8AD251176}"/>
+                <a16:creationId xmlns:a16="http://schemas.microsoft.com/office/drawing/2014/main" xmlns="" id="{21CC82E2-9AF2-4638-B02F-6BB8AD251176}"/>
               </a:ext>
             </a:extLst>
           </p:cNvPr>
@@ -853,7 +853,7 @@
           <p:cNvPr id="6" name="Slide Number Placeholder 5">
             <a:extLst>
               <a:ext uri="{FF2B5EF4-FFF2-40B4-BE49-F238E27FC236}">
-                <a16:creationId xmlns:a16="http://schemas.microsoft.com/office/drawing/2014/main" id="{0EF2029B-DC56-4B18-9335-D121A486F2C5}"/>
+                <a16:creationId xmlns:a16="http://schemas.microsoft.com/office/drawing/2014/main" xmlns="" id="{0EF2029B-DC56-4B18-9335-D121A486F2C5}"/>
               </a:ext>
             </a:extLst>
           </p:cNvPr>
@@ -912,7 +912,7 @@
           <p:cNvPr id="2" name="Vertical Title 1">
             <a:extLst>
               <a:ext uri="{FF2B5EF4-FFF2-40B4-BE49-F238E27FC236}">
-                <a16:creationId xmlns:a16="http://schemas.microsoft.com/office/drawing/2014/main" id="{99490A9E-4495-4DE9-B65C-2540637ECF88}"/>
+                <a16:creationId xmlns:a16="http://schemas.microsoft.com/office/drawing/2014/main" xmlns="" id="{99490A9E-4495-4DE9-B65C-2540637ECF88}"/>
               </a:ext>
             </a:extLst>
           </p:cNvPr>
@@ -946,7 +946,7 @@
           <p:cNvPr id="3" name="Vertical Text Placeholder 2">
             <a:extLst>
               <a:ext uri="{FF2B5EF4-FFF2-40B4-BE49-F238E27FC236}">
-                <a16:creationId xmlns:a16="http://schemas.microsoft.com/office/drawing/2014/main" id="{6217E859-2163-4275-AB9C-1509EAC9061F}"/>
+                <a16:creationId xmlns:a16="http://schemas.microsoft.com/office/drawing/2014/main" xmlns="" id="{6217E859-2163-4275-AB9C-1509EAC9061F}"/>
               </a:ext>
             </a:extLst>
           </p:cNvPr>
@@ -1009,7 +1009,7 @@
           <p:cNvPr id="4" name="Date Placeholder 3">
             <a:extLst>
               <a:ext uri="{FF2B5EF4-FFF2-40B4-BE49-F238E27FC236}">
-                <a16:creationId xmlns:a16="http://schemas.microsoft.com/office/drawing/2014/main" id="{E73E69AE-D566-4EBF-AF97-32BC0D091D9B}"/>
+                <a16:creationId xmlns:a16="http://schemas.microsoft.com/office/drawing/2014/main" xmlns="" id="{E73E69AE-D566-4EBF-AF97-32BC0D091D9B}"/>
               </a:ext>
             </a:extLst>
           </p:cNvPr>
@@ -1038,7 +1038,7 @@
           <p:cNvPr id="5" name="Footer Placeholder 4">
             <a:extLst>
               <a:ext uri="{FF2B5EF4-FFF2-40B4-BE49-F238E27FC236}">
-                <a16:creationId xmlns:a16="http://schemas.microsoft.com/office/drawing/2014/main" id="{813B4114-4EB2-4E1C-ABD1-97244A21A83C}"/>
+                <a16:creationId xmlns:a16="http://schemas.microsoft.com/office/drawing/2014/main" xmlns="" id="{813B4114-4EB2-4E1C-ABD1-97244A21A83C}"/>
               </a:ext>
             </a:extLst>
           </p:cNvPr>
@@ -1063,7 +1063,7 @@
           <p:cNvPr id="6" name="Slide Number Placeholder 5">
             <a:extLst>
               <a:ext uri="{FF2B5EF4-FFF2-40B4-BE49-F238E27FC236}">
-                <a16:creationId xmlns:a16="http://schemas.microsoft.com/office/drawing/2014/main" id="{6345922B-8924-4A04-B2F6-2645DBBCA938}"/>
+                <a16:creationId xmlns:a16="http://schemas.microsoft.com/office/drawing/2014/main" xmlns="" id="{6345922B-8924-4A04-B2F6-2645DBBCA938}"/>
               </a:ext>
             </a:extLst>
           </p:cNvPr>
@@ -1122,7 +1122,7 @@
           <p:cNvPr id="2" name="Title 1">
             <a:extLst>
               <a:ext uri="{FF2B5EF4-FFF2-40B4-BE49-F238E27FC236}">
-                <a16:creationId xmlns:a16="http://schemas.microsoft.com/office/drawing/2014/main" id="{4A2F0E04-AE86-4676-89AA-8FA4AFB935A1}"/>
+                <a16:creationId xmlns:a16="http://schemas.microsoft.com/office/drawing/2014/main" xmlns="" id="{4A2F0E04-AE86-4676-89AA-8FA4AFB935A1}"/>
               </a:ext>
             </a:extLst>
           </p:cNvPr>
@@ -1151,7 +1151,7 @@
           <p:cNvPr id="3" name="Content Placeholder 2">
             <a:extLst>
               <a:ext uri="{FF2B5EF4-FFF2-40B4-BE49-F238E27FC236}">
-                <a16:creationId xmlns:a16="http://schemas.microsoft.com/office/drawing/2014/main" id="{82D00283-8E24-4C4B-9903-5FA0442C9D84}"/>
+                <a16:creationId xmlns:a16="http://schemas.microsoft.com/office/drawing/2014/main" xmlns="" id="{82D00283-8E24-4C4B-9903-5FA0442C9D84}"/>
               </a:ext>
             </a:extLst>
           </p:cNvPr>
@@ -1209,7 +1209,7 @@
           <p:cNvPr id="4" name="Date Placeholder 3">
             <a:extLst>
               <a:ext uri="{FF2B5EF4-FFF2-40B4-BE49-F238E27FC236}">
-                <a16:creationId xmlns:a16="http://schemas.microsoft.com/office/drawing/2014/main" id="{D415CD68-DCCC-4370-9B7C-1F0697AEA001}"/>
+                <a16:creationId xmlns:a16="http://schemas.microsoft.com/office/drawing/2014/main" xmlns="" id="{D415CD68-DCCC-4370-9B7C-1F0697AEA001}"/>
               </a:ext>
             </a:extLst>
           </p:cNvPr>
@@ -1238,7 +1238,7 @@
           <p:cNvPr id="5" name="Footer Placeholder 4">
             <a:extLst>
               <a:ext uri="{FF2B5EF4-FFF2-40B4-BE49-F238E27FC236}">
-                <a16:creationId xmlns:a16="http://schemas.microsoft.com/office/drawing/2014/main" id="{489110B7-D3CE-4054-934E-B399A13E2363}"/>
+                <a16:creationId xmlns:a16="http://schemas.microsoft.com/office/drawing/2014/main" xmlns="" id="{489110B7-D3CE-4054-934E-B399A13E2363}"/>
               </a:ext>
             </a:extLst>
           </p:cNvPr>
@@ -1263,7 +1263,7 @@
           <p:cNvPr id="6" name="Slide Number Placeholder 5">
             <a:extLst>
               <a:ext uri="{FF2B5EF4-FFF2-40B4-BE49-F238E27FC236}">
-                <a16:creationId xmlns:a16="http://schemas.microsoft.com/office/drawing/2014/main" id="{B264BF5A-EEB7-40AA-AB98-B95E0F38C4DE}"/>
+                <a16:creationId xmlns:a16="http://schemas.microsoft.com/office/drawing/2014/main" xmlns="" id="{B264BF5A-EEB7-40AA-AB98-B95E0F38C4DE}"/>
               </a:ext>
             </a:extLst>
           </p:cNvPr>
@@ -1292,7 +1292,7 @@
           <p:cNvPr id="8" name="Picture 7">
             <a:extLst>
               <a:ext uri="{FF2B5EF4-FFF2-40B4-BE49-F238E27FC236}">
-                <a16:creationId xmlns:a16="http://schemas.microsoft.com/office/drawing/2014/main" id="{22631196-6601-4750-926C-6A82B67D44A6}"/>
+                <a16:creationId xmlns:a16="http://schemas.microsoft.com/office/drawing/2014/main" xmlns="" id="{22631196-6601-4750-926C-6A82B67D44A6}"/>
               </a:ext>
             </a:extLst>
           </p:cNvPr>
@@ -1328,7 +1328,7 @@
           <p:cNvPr id="10" name="Picture 9">
             <a:extLst>
               <a:ext uri="{FF2B5EF4-FFF2-40B4-BE49-F238E27FC236}">
-                <a16:creationId xmlns:a16="http://schemas.microsoft.com/office/drawing/2014/main" id="{ECD480B8-A86F-4B6A-9AB6-9976B2FB86AC}"/>
+                <a16:creationId xmlns:a16="http://schemas.microsoft.com/office/drawing/2014/main" xmlns="" id="{ECD480B8-A86F-4B6A-9AB6-9976B2FB86AC}"/>
               </a:ext>
             </a:extLst>
           </p:cNvPr>
@@ -1394,7 +1394,7 @@
           <p:cNvPr id="2" name="Title 1">
             <a:extLst>
               <a:ext uri="{FF2B5EF4-FFF2-40B4-BE49-F238E27FC236}">
-                <a16:creationId xmlns:a16="http://schemas.microsoft.com/office/drawing/2014/main" id="{2BA10DFF-CBF3-48B9-B634-183D0FD83728}"/>
+                <a16:creationId xmlns:a16="http://schemas.microsoft.com/office/drawing/2014/main" xmlns="" id="{2BA10DFF-CBF3-48B9-B634-183D0FD83728}"/>
               </a:ext>
             </a:extLst>
           </p:cNvPr>
@@ -1432,7 +1432,7 @@
           <p:cNvPr id="3" name="Text Placeholder 2">
             <a:extLst>
               <a:ext uri="{FF2B5EF4-FFF2-40B4-BE49-F238E27FC236}">
-                <a16:creationId xmlns:a16="http://schemas.microsoft.com/office/drawing/2014/main" id="{003EA747-44C9-4B16-AA7F-D6A2DD933035}"/>
+                <a16:creationId xmlns:a16="http://schemas.microsoft.com/office/drawing/2014/main" xmlns="" id="{003EA747-44C9-4B16-AA7F-D6A2DD933035}"/>
               </a:ext>
             </a:extLst>
           </p:cNvPr>
@@ -1557,7 +1557,7 @@
           <p:cNvPr id="4" name="Date Placeholder 3">
             <a:extLst>
               <a:ext uri="{FF2B5EF4-FFF2-40B4-BE49-F238E27FC236}">
-                <a16:creationId xmlns:a16="http://schemas.microsoft.com/office/drawing/2014/main" id="{4272D937-5EF1-4B86-BE48-B0009F1271BF}"/>
+                <a16:creationId xmlns:a16="http://schemas.microsoft.com/office/drawing/2014/main" xmlns="" id="{4272D937-5EF1-4B86-BE48-B0009F1271BF}"/>
               </a:ext>
             </a:extLst>
           </p:cNvPr>
@@ -1586,7 +1586,7 @@
           <p:cNvPr id="5" name="Footer Placeholder 4">
             <a:extLst>
               <a:ext uri="{FF2B5EF4-FFF2-40B4-BE49-F238E27FC236}">
-                <a16:creationId xmlns:a16="http://schemas.microsoft.com/office/drawing/2014/main" id="{C9C13D56-A7F2-4772-8F0C-DD3A0E6EB0DF}"/>
+                <a16:creationId xmlns:a16="http://schemas.microsoft.com/office/drawing/2014/main" xmlns="" id="{C9C13D56-A7F2-4772-8F0C-DD3A0E6EB0DF}"/>
               </a:ext>
             </a:extLst>
           </p:cNvPr>
@@ -1611,7 +1611,7 @@
           <p:cNvPr id="6" name="Slide Number Placeholder 5">
             <a:extLst>
               <a:ext uri="{FF2B5EF4-FFF2-40B4-BE49-F238E27FC236}">
-                <a16:creationId xmlns:a16="http://schemas.microsoft.com/office/drawing/2014/main" id="{77A4D869-1B20-457C-B712-F34FF064A2FC}"/>
+                <a16:creationId xmlns:a16="http://schemas.microsoft.com/office/drawing/2014/main" xmlns="" id="{77A4D869-1B20-457C-B712-F34FF064A2FC}"/>
               </a:ext>
             </a:extLst>
           </p:cNvPr>
@@ -1670,7 +1670,7 @@
           <p:cNvPr id="2" name="Title 1">
             <a:extLst>
               <a:ext uri="{FF2B5EF4-FFF2-40B4-BE49-F238E27FC236}">
-                <a16:creationId xmlns:a16="http://schemas.microsoft.com/office/drawing/2014/main" id="{C68AD54B-A2EB-411D-B843-4B5210143921}"/>
+                <a16:creationId xmlns:a16="http://schemas.microsoft.com/office/drawing/2014/main" xmlns="" id="{C68AD54B-A2EB-411D-B843-4B5210143921}"/>
               </a:ext>
             </a:extLst>
           </p:cNvPr>
@@ -1699,7 +1699,7 @@
           <p:cNvPr id="3" name="Content Placeholder 2">
             <a:extLst>
               <a:ext uri="{FF2B5EF4-FFF2-40B4-BE49-F238E27FC236}">
-                <a16:creationId xmlns:a16="http://schemas.microsoft.com/office/drawing/2014/main" id="{0E2EF2ED-6E3E-4F0A-8202-AC642197C17E}"/>
+                <a16:creationId xmlns:a16="http://schemas.microsoft.com/office/drawing/2014/main" xmlns="" id="{0E2EF2ED-6E3E-4F0A-8202-AC642197C17E}"/>
               </a:ext>
             </a:extLst>
           </p:cNvPr>
@@ -1762,7 +1762,7 @@
           <p:cNvPr id="4" name="Content Placeholder 3">
             <a:extLst>
               <a:ext uri="{FF2B5EF4-FFF2-40B4-BE49-F238E27FC236}">
-                <a16:creationId xmlns:a16="http://schemas.microsoft.com/office/drawing/2014/main" id="{A21F1DD6-DE31-4356-82D1-121AEEC826B7}"/>
+                <a16:creationId xmlns:a16="http://schemas.microsoft.com/office/drawing/2014/main" xmlns="" id="{A21F1DD6-DE31-4356-82D1-121AEEC826B7}"/>
               </a:ext>
             </a:extLst>
           </p:cNvPr>
@@ -1825,7 +1825,7 @@
           <p:cNvPr id="5" name="Date Placeholder 4">
             <a:extLst>
               <a:ext uri="{FF2B5EF4-FFF2-40B4-BE49-F238E27FC236}">
-                <a16:creationId xmlns:a16="http://schemas.microsoft.com/office/drawing/2014/main" id="{84D3BA65-1130-45EF-BD39-D535AF74A0E2}"/>
+                <a16:creationId xmlns:a16="http://schemas.microsoft.com/office/drawing/2014/main" xmlns="" id="{84D3BA65-1130-45EF-BD39-D535AF74A0E2}"/>
               </a:ext>
             </a:extLst>
           </p:cNvPr>
@@ -1854,7 +1854,7 @@
           <p:cNvPr id="6" name="Footer Placeholder 5">
             <a:extLst>
               <a:ext uri="{FF2B5EF4-FFF2-40B4-BE49-F238E27FC236}">
-                <a16:creationId xmlns:a16="http://schemas.microsoft.com/office/drawing/2014/main" id="{0619695C-633A-4D9F-B3BD-448369141B81}"/>
+                <a16:creationId xmlns:a16="http://schemas.microsoft.com/office/drawing/2014/main" xmlns="" id="{0619695C-633A-4D9F-B3BD-448369141B81}"/>
               </a:ext>
             </a:extLst>
           </p:cNvPr>
@@ -1879,7 +1879,7 @@
           <p:cNvPr id="7" name="Slide Number Placeholder 6">
             <a:extLst>
               <a:ext uri="{FF2B5EF4-FFF2-40B4-BE49-F238E27FC236}">
-                <a16:creationId xmlns:a16="http://schemas.microsoft.com/office/drawing/2014/main" id="{CF759FEB-258B-44A3-9875-A646D893CECC}"/>
+                <a16:creationId xmlns:a16="http://schemas.microsoft.com/office/drawing/2014/main" xmlns="" id="{CF759FEB-258B-44A3-9875-A646D893CECC}"/>
               </a:ext>
             </a:extLst>
           </p:cNvPr>
@@ -1938,7 +1938,7 @@
           <p:cNvPr id="2" name="Title 1">
             <a:extLst>
               <a:ext uri="{FF2B5EF4-FFF2-40B4-BE49-F238E27FC236}">
-                <a16:creationId xmlns:a16="http://schemas.microsoft.com/office/drawing/2014/main" id="{88199CB4-6935-4FFC-A300-DE7E32B278D4}"/>
+                <a16:creationId xmlns:a16="http://schemas.microsoft.com/office/drawing/2014/main" xmlns="" id="{88199CB4-6935-4FFC-A300-DE7E32B278D4}"/>
               </a:ext>
             </a:extLst>
           </p:cNvPr>
@@ -1972,7 +1972,7 @@
           <p:cNvPr id="3" name="Text Placeholder 2">
             <a:extLst>
               <a:ext uri="{FF2B5EF4-FFF2-40B4-BE49-F238E27FC236}">
-                <a16:creationId xmlns:a16="http://schemas.microsoft.com/office/drawing/2014/main" id="{61001AE1-FF80-4575-BDCA-7A4DE3448E79}"/>
+                <a16:creationId xmlns:a16="http://schemas.microsoft.com/office/drawing/2014/main" xmlns="" id="{61001AE1-FF80-4575-BDCA-7A4DE3448E79}"/>
               </a:ext>
             </a:extLst>
           </p:cNvPr>
@@ -2043,7 +2043,7 @@
           <p:cNvPr id="4" name="Content Placeholder 3">
             <a:extLst>
               <a:ext uri="{FF2B5EF4-FFF2-40B4-BE49-F238E27FC236}">
-                <a16:creationId xmlns:a16="http://schemas.microsoft.com/office/drawing/2014/main" id="{80AC87B8-0E15-4D71-8E92-E09A975EDDE2}"/>
+                <a16:creationId xmlns:a16="http://schemas.microsoft.com/office/drawing/2014/main" xmlns="" id="{80AC87B8-0E15-4D71-8E92-E09A975EDDE2}"/>
               </a:ext>
             </a:extLst>
           </p:cNvPr>
@@ -2106,7 +2106,7 @@
           <p:cNvPr id="5" name="Text Placeholder 4">
             <a:extLst>
               <a:ext uri="{FF2B5EF4-FFF2-40B4-BE49-F238E27FC236}">
-                <a16:creationId xmlns:a16="http://schemas.microsoft.com/office/drawing/2014/main" id="{B72C501A-A87C-42CE-B804-47D5F48E04B9}"/>
+                <a16:creationId xmlns:a16="http://schemas.microsoft.com/office/drawing/2014/main" xmlns="" id="{B72C501A-A87C-42CE-B804-47D5F48E04B9}"/>
               </a:ext>
             </a:extLst>
           </p:cNvPr>
@@ -2177,7 +2177,7 @@
           <p:cNvPr id="6" name="Content Placeholder 5">
             <a:extLst>
               <a:ext uri="{FF2B5EF4-FFF2-40B4-BE49-F238E27FC236}">
-                <a16:creationId xmlns:a16="http://schemas.microsoft.com/office/drawing/2014/main" id="{FA2D022B-0528-4464-84A0-58DFFF233BA5}"/>
+                <a16:creationId xmlns:a16="http://schemas.microsoft.com/office/drawing/2014/main" xmlns="" id="{FA2D022B-0528-4464-84A0-58DFFF233BA5}"/>
               </a:ext>
             </a:extLst>
           </p:cNvPr>
@@ -2240,7 +2240,7 @@
           <p:cNvPr id="7" name="Date Placeholder 6">
             <a:extLst>
               <a:ext uri="{FF2B5EF4-FFF2-40B4-BE49-F238E27FC236}">
-                <a16:creationId xmlns:a16="http://schemas.microsoft.com/office/drawing/2014/main" id="{A6EF0899-E90C-4FF1-BDE9-1F19154F363A}"/>
+                <a16:creationId xmlns:a16="http://schemas.microsoft.com/office/drawing/2014/main" xmlns="" id="{A6EF0899-E90C-4FF1-BDE9-1F19154F363A}"/>
               </a:ext>
             </a:extLst>
           </p:cNvPr>
@@ -2269,7 +2269,7 @@
           <p:cNvPr id="8" name="Footer Placeholder 7">
             <a:extLst>
               <a:ext uri="{FF2B5EF4-FFF2-40B4-BE49-F238E27FC236}">
-                <a16:creationId xmlns:a16="http://schemas.microsoft.com/office/drawing/2014/main" id="{59590381-32ED-4803-AD77-82E1C6B55282}"/>
+                <a16:creationId xmlns:a16="http://schemas.microsoft.com/office/drawing/2014/main" xmlns="" id="{59590381-32ED-4803-AD77-82E1C6B55282}"/>
               </a:ext>
             </a:extLst>
           </p:cNvPr>
@@ -2294,7 +2294,7 @@
           <p:cNvPr id="9" name="Slide Number Placeholder 8">
             <a:extLst>
               <a:ext uri="{FF2B5EF4-FFF2-40B4-BE49-F238E27FC236}">
-                <a16:creationId xmlns:a16="http://schemas.microsoft.com/office/drawing/2014/main" id="{4AF58ADB-166D-4EB3-9427-4C2A14CA959B}"/>
+                <a16:creationId xmlns:a16="http://schemas.microsoft.com/office/drawing/2014/main" xmlns="" id="{4AF58ADB-166D-4EB3-9427-4C2A14CA959B}"/>
               </a:ext>
             </a:extLst>
           </p:cNvPr>
@@ -2353,7 +2353,7 @@
           <p:cNvPr id="2" name="Title 1">
             <a:extLst>
               <a:ext uri="{FF2B5EF4-FFF2-40B4-BE49-F238E27FC236}">
-                <a16:creationId xmlns:a16="http://schemas.microsoft.com/office/drawing/2014/main" id="{0B5DF82A-AA4A-4378-9453-99A85B96D8BA}"/>
+                <a16:creationId xmlns:a16="http://schemas.microsoft.com/office/drawing/2014/main" xmlns="" id="{0B5DF82A-AA4A-4378-9453-99A85B96D8BA}"/>
               </a:ext>
             </a:extLst>
           </p:cNvPr>
@@ -2382,7 +2382,7 @@
           <p:cNvPr id="3" name="Date Placeholder 2">
             <a:extLst>
               <a:ext uri="{FF2B5EF4-FFF2-40B4-BE49-F238E27FC236}">
-                <a16:creationId xmlns:a16="http://schemas.microsoft.com/office/drawing/2014/main" id="{373AF506-FA0F-41EF-917D-71C64D328580}"/>
+                <a16:creationId xmlns:a16="http://schemas.microsoft.com/office/drawing/2014/main" xmlns="" id="{373AF506-FA0F-41EF-917D-71C64D328580}"/>
               </a:ext>
             </a:extLst>
           </p:cNvPr>
@@ -2411,7 +2411,7 @@
           <p:cNvPr id="4" name="Footer Placeholder 3">
             <a:extLst>
               <a:ext uri="{FF2B5EF4-FFF2-40B4-BE49-F238E27FC236}">
-                <a16:creationId xmlns:a16="http://schemas.microsoft.com/office/drawing/2014/main" id="{CE1B70A4-41CE-4DE3-B874-E43B3FB59891}"/>
+                <a16:creationId xmlns:a16="http://schemas.microsoft.com/office/drawing/2014/main" xmlns="" id="{CE1B70A4-41CE-4DE3-B874-E43B3FB59891}"/>
               </a:ext>
             </a:extLst>
           </p:cNvPr>
@@ -2436,7 +2436,7 @@
           <p:cNvPr id="5" name="Slide Number Placeholder 4">
             <a:extLst>
               <a:ext uri="{FF2B5EF4-FFF2-40B4-BE49-F238E27FC236}">
-                <a16:creationId xmlns:a16="http://schemas.microsoft.com/office/drawing/2014/main" id="{26BC2935-601A-4D47-833E-B88197F92084}"/>
+                <a16:creationId xmlns:a16="http://schemas.microsoft.com/office/drawing/2014/main" xmlns="" id="{26BC2935-601A-4D47-833E-B88197F92084}"/>
               </a:ext>
             </a:extLst>
           </p:cNvPr>
@@ -2495,7 +2495,7 @@
           <p:cNvPr id="2" name="Date Placeholder 1">
             <a:extLst>
               <a:ext uri="{FF2B5EF4-FFF2-40B4-BE49-F238E27FC236}">
-                <a16:creationId xmlns:a16="http://schemas.microsoft.com/office/drawing/2014/main" id="{DF406A68-3A30-42BC-83B1-42CE624ED3B8}"/>
+                <a16:creationId xmlns:a16="http://schemas.microsoft.com/office/drawing/2014/main" xmlns="" id="{DF406A68-3A30-42BC-83B1-42CE624ED3B8}"/>
               </a:ext>
             </a:extLst>
           </p:cNvPr>
@@ -2524,7 +2524,7 @@
           <p:cNvPr id="3" name="Footer Placeholder 2">
             <a:extLst>
               <a:ext uri="{FF2B5EF4-FFF2-40B4-BE49-F238E27FC236}">
-                <a16:creationId xmlns:a16="http://schemas.microsoft.com/office/drawing/2014/main" id="{F0413A17-30D8-4355-8485-0940ECD052AF}"/>
+                <a16:creationId xmlns:a16="http://schemas.microsoft.com/office/drawing/2014/main" xmlns="" id="{F0413A17-30D8-4355-8485-0940ECD052AF}"/>
               </a:ext>
             </a:extLst>
           </p:cNvPr>
@@ -2549,7 +2549,7 @@
           <p:cNvPr id="4" name="Slide Number Placeholder 3">
             <a:extLst>
               <a:ext uri="{FF2B5EF4-FFF2-40B4-BE49-F238E27FC236}">
-                <a16:creationId xmlns:a16="http://schemas.microsoft.com/office/drawing/2014/main" id="{9FFA60EC-6CE6-40BC-98C7-78D139E39575}"/>
+                <a16:creationId xmlns:a16="http://schemas.microsoft.com/office/drawing/2014/main" xmlns="" id="{9FFA60EC-6CE6-40BC-98C7-78D139E39575}"/>
               </a:ext>
             </a:extLst>
           </p:cNvPr>
@@ -2608,7 +2608,7 @@
           <p:cNvPr id="2" name="Title 1">
             <a:extLst>
               <a:ext uri="{FF2B5EF4-FFF2-40B4-BE49-F238E27FC236}">
-                <a16:creationId xmlns:a16="http://schemas.microsoft.com/office/drawing/2014/main" id="{4666C51B-0116-4D15-B924-1AC92F4C5157}"/>
+                <a16:creationId xmlns:a16="http://schemas.microsoft.com/office/drawing/2014/main" xmlns="" id="{4666C51B-0116-4D15-B924-1AC92F4C5157}"/>
               </a:ext>
             </a:extLst>
           </p:cNvPr>
@@ -2646,7 +2646,7 @@
           <p:cNvPr id="3" name="Content Placeholder 2">
             <a:extLst>
               <a:ext uri="{FF2B5EF4-FFF2-40B4-BE49-F238E27FC236}">
-                <a16:creationId xmlns:a16="http://schemas.microsoft.com/office/drawing/2014/main" id="{BACF135F-DEA4-439D-B839-300E91330461}"/>
+                <a16:creationId xmlns:a16="http://schemas.microsoft.com/office/drawing/2014/main" xmlns="" id="{BACF135F-DEA4-439D-B839-300E91330461}"/>
               </a:ext>
             </a:extLst>
           </p:cNvPr>
@@ -2737,7 +2737,7 @@
           <p:cNvPr id="4" name="Text Placeholder 3">
             <a:extLst>
               <a:ext uri="{FF2B5EF4-FFF2-40B4-BE49-F238E27FC236}">
-                <a16:creationId xmlns:a16="http://schemas.microsoft.com/office/drawing/2014/main" id="{116FE589-150A-4FBF-B8E7-12E4199F8079}"/>
+                <a16:creationId xmlns:a16="http://schemas.microsoft.com/office/drawing/2014/main" xmlns="" id="{116FE589-150A-4FBF-B8E7-12E4199F8079}"/>
               </a:ext>
             </a:extLst>
           </p:cNvPr>
@@ -2808,7 +2808,7 @@
           <p:cNvPr id="5" name="Date Placeholder 4">
             <a:extLst>
               <a:ext uri="{FF2B5EF4-FFF2-40B4-BE49-F238E27FC236}">
-                <a16:creationId xmlns:a16="http://schemas.microsoft.com/office/drawing/2014/main" id="{8DFC4612-CEEF-4DB7-8C0B-1A11D8A51E39}"/>
+                <a16:creationId xmlns:a16="http://schemas.microsoft.com/office/drawing/2014/main" xmlns="" id="{8DFC4612-CEEF-4DB7-8C0B-1A11D8A51E39}"/>
               </a:ext>
             </a:extLst>
           </p:cNvPr>
@@ -2837,7 +2837,7 @@
           <p:cNvPr id="6" name="Footer Placeholder 5">
             <a:extLst>
               <a:ext uri="{FF2B5EF4-FFF2-40B4-BE49-F238E27FC236}">
-                <a16:creationId xmlns:a16="http://schemas.microsoft.com/office/drawing/2014/main" id="{B9B7AA44-B39C-44A4-A2A5-65E18EA963BD}"/>
+                <a16:creationId xmlns:a16="http://schemas.microsoft.com/office/drawing/2014/main" xmlns="" id="{B9B7AA44-B39C-44A4-A2A5-65E18EA963BD}"/>
               </a:ext>
             </a:extLst>
           </p:cNvPr>
@@ -2862,7 +2862,7 @@
           <p:cNvPr id="7" name="Slide Number Placeholder 6">
             <a:extLst>
               <a:ext uri="{FF2B5EF4-FFF2-40B4-BE49-F238E27FC236}">
-                <a16:creationId xmlns:a16="http://schemas.microsoft.com/office/drawing/2014/main" id="{C0867FC8-6B5D-41B2-8E89-8F8FC274A5A7}"/>
+                <a16:creationId xmlns:a16="http://schemas.microsoft.com/office/drawing/2014/main" xmlns="" id="{C0867FC8-6B5D-41B2-8E89-8F8FC274A5A7}"/>
               </a:ext>
             </a:extLst>
           </p:cNvPr>
@@ -2921,7 +2921,7 @@
           <p:cNvPr id="2" name="Title 1">
             <a:extLst>
               <a:ext uri="{FF2B5EF4-FFF2-40B4-BE49-F238E27FC236}">
-                <a16:creationId xmlns:a16="http://schemas.microsoft.com/office/drawing/2014/main" id="{47F573DC-4F0A-4D07-AB63-2986B0BC073E}"/>
+                <a16:creationId xmlns:a16="http://schemas.microsoft.com/office/drawing/2014/main" xmlns="" id="{47F573DC-4F0A-4D07-AB63-2986B0BC073E}"/>
               </a:ext>
             </a:extLst>
           </p:cNvPr>
@@ -2959,7 +2959,7 @@
           <p:cNvPr id="3" name="Picture Placeholder 2">
             <a:extLst>
               <a:ext uri="{FF2B5EF4-FFF2-40B4-BE49-F238E27FC236}">
-                <a16:creationId xmlns:a16="http://schemas.microsoft.com/office/drawing/2014/main" id="{7A8AA7D1-191A-490A-8DFF-E456467FA398}"/>
+                <a16:creationId xmlns:a16="http://schemas.microsoft.com/office/drawing/2014/main" xmlns="" id="{7A8AA7D1-191A-490A-8DFF-E456467FA398}"/>
               </a:ext>
             </a:extLst>
           </p:cNvPr>
@@ -3026,7 +3026,7 @@
           <p:cNvPr id="4" name="Text Placeholder 3">
             <a:extLst>
               <a:ext uri="{FF2B5EF4-FFF2-40B4-BE49-F238E27FC236}">
-                <a16:creationId xmlns:a16="http://schemas.microsoft.com/office/drawing/2014/main" id="{9A88F2BC-46C2-4936-B161-368E242DE51E}"/>
+                <a16:creationId xmlns:a16="http://schemas.microsoft.com/office/drawing/2014/main" xmlns="" id="{9A88F2BC-46C2-4936-B161-368E242DE51E}"/>
               </a:ext>
             </a:extLst>
           </p:cNvPr>
@@ -3097,7 +3097,7 @@
           <p:cNvPr id="5" name="Date Placeholder 4">
             <a:extLst>
               <a:ext uri="{FF2B5EF4-FFF2-40B4-BE49-F238E27FC236}">
-                <a16:creationId xmlns:a16="http://schemas.microsoft.com/office/drawing/2014/main" id="{114190F6-8E99-455F-8873-ACD4741CE5B3}"/>
+                <a16:creationId xmlns:a16="http://schemas.microsoft.com/office/drawing/2014/main" xmlns="" id="{114190F6-8E99-455F-8873-ACD4741CE5B3}"/>
               </a:ext>
             </a:extLst>
           </p:cNvPr>
@@ -3126,7 +3126,7 @@
           <p:cNvPr id="6" name="Footer Placeholder 5">
             <a:extLst>
               <a:ext uri="{FF2B5EF4-FFF2-40B4-BE49-F238E27FC236}">
-                <a16:creationId xmlns:a16="http://schemas.microsoft.com/office/drawing/2014/main" id="{CF89B307-BA20-4F3D-9C42-821EA2BA85F2}"/>
+                <a16:creationId xmlns:a16="http://schemas.microsoft.com/office/drawing/2014/main" xmlns="" id="{CF89B307-BA20-4F3D-9C42-821EA2BA85F2}"/>
               </a:ext>
             </a:extLst>
           </p:cNvPr>
@@ -3151,7 +3151,7 @@
           <p:cNvPr id="7" name="Slide Number Placeholder 6">
             <a:extLst>
               <a:ext uri="{FF2B5EF4-FFF2-40B4-BE49-F238E27FC236}">
-                <a16:creationId xmlns:a16="http://schemas.microsoft.com/office/drawing/2014/main" id="{7BBE9972-A95D-4AC5-A121-B7BA0AE8D859}"/>
+                <a16:creationId xmlns:a16="http://schemas.microsoft.com/office/drawing/2014/main" xmlns="" id="{7BBE9972-A95D-4AC5-A121-B7BA0AE8D859}"/>
               </a:ext>
             </a:extLst>
           </p:cNvPr>
@@ -3215,7 +3215,7 @@
           <p:cNvPr id="2" name="Title Placeholder 1">
             <a:extLst>
               <a:ext uri="{FF2B5EF4-FFF2-40B4-BE49-F238E27FC236}">
-                <a16:creationId xmlns:a16="http://schemas.microsoft.com/office/drawing/2014/main" id="{DF617E99-C01D-47DA-8506-81B8DA6006D3}"/>
+                <a16:creationId xmlns:a16="http://schemas.microsoft.com/office/drawing/2014/main" xmlns="" id="{DF617E99-C01D-47DA-8506-81B8DA6006D3}"/>
               </a:ext>
             </a:extLst>
           </p:cNvPr>
@@ -3254,7 +3254,7 @@
           <p:cNvPr id="3" name="Text Placeholder 2">
             <a:extLst>
               <a:ext uri="{FF2B5EF4-FFF2-40B4-BE49-F238E27FC236}">
-                <a16:creationId xmlns:a16="http://schemas.microsoft.com/office/drawing/2014/main" id="{A4C9C1C5-7B87-4C76-881A-743E31916A91}"/>
+                <a16:creationId xmlns:a16="http://schemas.microsoft.com/office/drawing/2014/main" xmlns="" id="{A4C9C1C5-7B87-4C76-881A-743E31916A91}"/>
               </a:ext>
             </a:extLst>
           </p:cNvPr>
@@ -3322,7 +3322,7 @@
           <p:cNvPr id="4" name="Date Placeholder 3">
             <a:extLst>
               <a:ext uri="{FF2B5EF4-FFF2-40B4-BE49-F238E27FC236}">
-                <a16:creationId xmlns:a16="http://schemas.microsoft.com/office/drawing/2014/main" id="{0CAE1C45-3DFB-49B2-BA86-E4CDDB9B9CE6}"/>
+                <a16:creationId xmlns:a16="http://schemas.microsoft.com/office/drawing/2014/main" xmlns="" id="{0CAE1C45-3DFB-49B2-BA86-E4CDDB9B9CE6}"/>
               </a:ext>
             </a:extLst>
           </p:cNvPr>
@@ -3369,7 +3369,7 @@
           <p:cNvPr id="5" name="Footer Placeholder 4">
             <a:extLst>
               <a:ext uri="{FF2B5EF4-FFF2-40B4-BE49-F238E27FC236}">
-                <a16:creationId xmlns:a16="http://schemas.microsoft.com/office/drawing/2014/main" id="{9F825317-E112-43C4-BDFA-623EF2116F8A}"/>
+                <a16:creationId xmlns:a16="http://schemas.microsoft.com/office/drawing/2014/main" xmlns="" id="{9F825317-E112-43C4-BDFA-623EF2116F8A}"/>
               </a:ext>
             </a:extLst>
           </p:cNvPr>
@@ -3412,7 +3412,7 @@
           <p:cNvPr id="6" name="Slide Number Placeholder 5">
             <a:extLst>
               <a:ext uri="{FF2B5EF4-FFF2-40B4-BE49-F238E27FC236}">
-                <a16:creationId xmlns:a16="http://schemas.microsoft.com/office/drawing/2014/main" id="{85BEDFDE-AAB4-42A2-A8E1-DBB11559E990}"/>
+                <a16:creationId xmlns:a16="http://schemas.microsoft.com/office/drawing/2014/main" xmlns="" id="{85BEDFDE-AAB4-42A2-A8E1-DBB11559E990}"/>
               </a:ext>
             </a:extLst>
           </p:cNvPr>
@@ -3780,7 +3780,7 @@
           <p:cNvPr id="4" name="Title 1">
             <a:extLst>
               <a:ext uri="{FF2B5EF4-FFF2-40B4-BE49-F238E27FC236}">
-                <a16:creationId xmlns:a16="http://schemas.microsoft.com/office/drawing/2014/main" id="{F1D9E568-0F90-4AF1-BB3F-AEC97F522351}"/>
+                <a16:creationId xmlns:a16="http://schemas.microsoft.com/office/drawing/2014/main" xmlns="" id="{F1D9E568-0F90-4AF1-BB3F-AEC97F522351}"/>
               </a:ext>
             </a:extLst>
           </p:cNvPr>
@@ -3854,7 +3854,7 @@
           <p:cNvPr id="5" name="Subtitle 2">
             <a:extLst>
               <a:ext uri="{FF2B5EF4-FFF2-40B4-BE49-F238E27FC236}">
-                <a16:creationId xmlns:a16="http://schemas.microsoft.com/office/drawing/2014/main" id="{09729DCF-9ED3-4CAB-8F2C-88D03978CD9B}"/>
+                <a16:creationId xmlns:a16="http://schemas.microsoft.com/office/drawing/2014/main" xmlns="" id="{09729DCF-9ED3-4CAB-8F2C-88D03978CD9B}"/>
               </a:ext>
             </a:extLst>
           </p:cNvPr>
@@ -4170,7 +4170,7 @@
           <p:cNvPr id="2" name="Title 1">
             <a:extLst>
               <a:ext uri="{FF2B5EF4-FFF2-40B4-BE49-F238E27FC236}">
-                <a16:creationId xmlns:a16="http://schemas.microsoft.com/office/drawing/2014/main" id="{1F078891-FCB8-4F1E-A106-35D8CF9BA377}"/>
+                <a16:creationId xmlns:a16="http://schemas.microsoft.com/office/drawing/2014/main" xmlns="" id="{1F078891-FCB8-4F1E-A106-35D8CF9BA377}"/>
               </a:ext>
             </a:extLst>
           </p:cNvPr>
@@ -4214,7 +4214,7 @@
           <p:cNvPr id="6" name="Content Placeholder 5">
             <a:extLst>
               <a:ext uri="{FF2B5EF4-FFF2-40B4-BE49-F238E27FC236}">
-                <a16:creationId xmlns:a16="http://schemas.microsoft.com/office/drawing/2014/main" id="{DCB9B7DF-405E-4ED5-9A4F-8E9AD909A874}"/>
+                <a16:creationId xmlns:a16="http://schemas.microsoft.com/office/drawing/2014/main" xmlns="" id="{DCB9B7DF-405E-4ED5-9A4F-8E9AD909A874}"/>
               </a:ext>
             </a:extLst>
           </p:cNvPr>
@@ -4279,7 +4279,7 @@
           <p:cNvPr id="2" name="Title 1">
             <a:extLst>
               <a:ext uri="{FF2B5EF4-FFF2-40B4-BE49-F238E27FC236}">
-                <a16:creationId xmlns:a16="http://schemas.microsoft.com/office/drawing/2014/main" id="{A6603D17-3C42-4BE3-8467-646B8EFAFF01}"/>
+                <a16:creationId xmlns:a16="http://schemas.microsoft.com/office/drawing/2014/main" xmlns="" id="{A6603D17-3C42-4BE3-8467-646B8EFAFF01}"/>
               </a:ext>
             </a:extLst>
           </p:cNvPr>
@@ -4311,7 +4311,7 @@
           <p:cNvPr id="5" name="Content Placeholder 4">
             <a:extLst>
               <a:ext uri="{FF2B5EF4-FFF2-40B4-BE49-F238E27FC236}">
-                <a16:creationId xmlns:a16="http://schemas.microsoft.com/office/drawing/2014/main" id="{3A47B8F6-D215-4DC2-BFA9-04ED207BEE68}"/>
+                <a16:creationId xmlns:a16="http://schemas.microsoft.com/office/drawing/2014/main" xmlns="" id="{3A47B8F6-D215-4DC2-BFA9-04ED207BEE68}"/>
               </a:ext>
             </a:extLst>
           </p:cNvPr>
@@ -4376,7 +4376,7 @@
           <p:cNvPr id="2" name="Title 1">
             <a:extLst>
               <a:ext uri="{FF2B5EF4-FFF2-40B4-BE49-F238E27FC236}">
-                <a16:creationId xmlns:a16="http://schemas.microsoft.com/office/drawing/2014/main" id="{7609D722-751F-4E09-9BBD-3464CDC46793}"/>
+                <a16:creationId xmlns:a16="http://schemas.microsoft.com/office/drawing/2014/main" xmlns="" id="{7609D722-751F-4E09-9BBD-3464CDC46793}"/>
               </a:ext>
             </a:extLst>
           </p:cNvPr>
@@ -4408,7 +4408,7 @@
           <p:cNvPr id="3" name="Content Placeholder 2">
             <a:extLst>
               <a:ext uri="{FF2B5EF4-FFF2-40B4-BE49-F238E27FC236}">
-                <a16:creationId xmlns:a16="http://schemas.microsoft.com/office/drawing/2014/main" id="{4D29ECEF-DAF8-44E2-A54E-FB8584D81890}"/>
+                <a16:creationId xmlns:a16="http://schemas.microsoft.com/office/drawing/2014/main" xmlns="" id="{4D29ECEF-DAF8-44E2-A54E-FB8584D81890}"/>
               </a:ext>
             </a:extLst>
           </p:cNvPr>

</xml_diff>